<commit_message>
fixing a couple small errors on the UML
</commit_message>
<xml_diff>
--- a/FinalPresentation.pptx
+++ b/FinalPresentation.pptx
@@ -105,6 +105,11 @@
       </a:defRPr>
     </a:lvl9pPr>
   </p:defaultTextStyle>
+  <p:extLst>
+    <p:ext uri="{EFAFB233-063F-42B5-8137-9DF3F51BA10A}">
+      <p15:sldGuideLst xmlns:p15="http://schemas.microsoft.com/office/powerpoint/2012/main"/>
+    </p:ext>
+  </p:extLst>
 </p:presentation>
 </file>
 
@@ -5825,36 +5830,6 @@
           <a:chExt cx="0" cy="0"/>
         </a:xfrm>
       </p:grpSpPr>
-      <p:pic>
-        <p:nvPicPr>
-          <p:cNvPr id="12" name="Picture 11">
-            <a:extLst>
-              <a:ext uri="{FF2B5EF4-FFF2-40B4-BE49-F238E27FC236}">
-                <a16:creationId xmlns:a16="http://schemas.microsoft.com/office/drawing/2014/main" id="{F795AC93-2CC3-4E2D-88B9-1987B28EF89D}"/>
-              </a:ext>
-            </a:extLst>
-          </p:cNvPr>
-          <p:cNvPicPr>
-            <a:picLocks noChangeAspect="1"/>
-          </p:cNvPicPr>
-          <p:nvPr/>
-        </p:nvPicPr>
-        <p:blipFill>
-          <a:blip r:embed="rId2"/>
-          <a:stretch>
-            <a:fillRect/>
-          </a:stretch>
-        </p:blipFill>
-        <p:spPr>
-          <a:xfrm>
-            <a:off x="337159" y="336387"/>
-            <a:ext cx="11517682" cy="6281350"/>
-          </a:xfrm>
-          <a:prstGeom prst="rect">
-            <a:avLst/>
-          </a:prstGeom>
-        </p:spPr>
-      </p:pic>
       <p:sp>
         <p:nvSpPr>
           <p:cNvPr id="4" name="Title 3">
@@ -5905,8 +5880,8 @@
         </p:nvSpPr>
         <p:spPr>
           <a:xfrm>
-            <a:off x="677334" y="1672224"/>
-            <a:ext cx="3782860" cy="1320800"/>
+            <a:off x="7731806" y="609599"/>
+            <a:ext cx="4328576" cy="1510145"/>
           </a:xfrm>
           <a:prstGeom prst="rect">
             <a:avLst/>
@@ -5934,12 +5909,136 @@
           <a:p>
             <a:pPr algn="ctr"/>
             <a:r>
-              <a:rPr lang="en-US" sz="1200" i="1" dirty="0"/>
+              <a:rPr lang="en-US" sz="1600" i="1" dirty="0"/>
               <a:t>The goal of the smart mirror is to aggregate and present daily and upcoming tasks, aggregated for the user approaching the mirror based on supported, linked accounts.</a:t>
             </a:r>
           </a:p>
         </p:txBody>
       </p:sp>
+      <p:pic>
+        <p:nvPicPr>
+          <p:cNvPr id="3" name="Picture 2">
+            <a:extLst>
+              <a:ext uri="{FF2B5EF4-FFF2-40B4-BE49-F238E27FC236}">
+                <a16:creationId xmlns:a16="http://schemas.microsoft.com/office/drawing/2014/main" id="{6462160F-D6BB-411F-9B21-EBF92E97FD82}"/>
+              </a:ext>
+            </a:extLst>
+          </p:cNvPr>
+          <p:cNvPicPr>
+            <a:picLocks noChangeAspect="1"/>
+          </p:cNvPicPr>
+          <p:nvPr/>
+        </p:nvPicPr>
+        <p:blipFill>
+          <a:blip r:embed="rId2"/>
+          <a:stretch>
+            <a:fillRect/>
+          </a:stretch>
+        </p:blipFill>
+        <p:spPr>
+          <a:xfrm>
+            <a:off x="1205913" y="1704108"/>
+            <a:ext cx="5997315" cy="4883037"/>
+          </a:xfrm>
+          <a:prstGeom prst="rect">
+            <a:avLst/>
+          </a:prstGeom>
+        </p:spPr>
+      </p:pic>
+      <p:pic>
+        <p:nvPicPr>
+          <p:cNvPr id="1026" name="Picture 2" descr="Trello Logo, history, meaning, symbol, PNG">
+            <a:extLst>
+              <a:ext uri="{FF2B5EF4-FFF2-40B4-BE49-F238E27FC236}">
+                <a16:creationId xmlns:a16="http://schemas.microsoft.com/office/drawing/2014/main" id="{D74EF248-9C9C-435A-8F5A-BF9F88B7C902}"/>
+              </a:ext>
+            </a:extLst>
+          </p:cNvPr>
+          <p:cNvPicPr>
+            <a:picLocks noChangeAspect="1" noChangeArrowheads="1"/>
+          </p:cNvPicPr>
+          <p:nvPr/>
+        </p:nvPicPr>
+        <p:blipFill>
+          <a:blip r:embed="rId3">
+            <a:extLst>
+              <a:ext uri="{28A0092B-C50C-407E-A947-70E740481C1C}">
+                <a14:useLocalDpi xmlns:a14="http://schemas.microsoft.com/office/drawing/2010/main" val="0"/>
+              </a:ext>
+            </a:extLst>
+          </a:blip>
+          <a:srcRect/>
+          <a:stretch>
+            <a:fillRect/>
+          </a:stretch>
+        </p:blipFill>
+        <p:spPr bwMode="auto">
+          <a:xfrm>
+            <a:off x="7730837" y="2302888"/>
+            <a:ext cx="4329545" cy="2435369"/>
+          </a:xfrm>
+          <a:prstGeom prst="rect">
+            <a:avLst/>
+          </a:prstGeom>
+          <a:noFill/>
+          <a:extLst>
+            <a:ext uri="{909E8E84-426E-40DD-AFC4-6F175D3DCCD1}">
+              <a14:hiddenFill xmlns:a14="http://schemas.microsoft.com/office/drawing/2010/main">
+                <a:solidFill>
+                  <a:srgbClr val="FFFFFF"/>
+                </a:solidFill>
+              </a14:hiddenFill>
+            </a:ext>
+          </a:extLst>
+        </p:spPr>
+      </p:pic>
+      <p:pic>
+        <p:nvPicPr>
+          <p:cNvPr id="1028" name="Picture 4" descr="Google logo - Wikipedia">
+            <a:extLst>
+              <a:ext uri="{FF2B5EF4-FFF2-40B4-BE49-F238E27FC236}">
+                <a16:creationId xmlns:a16="http://schemas.microsoft.com/office/drawing/2014/main" id="{125FED6F-7A11-45F9-9E88-835230611F6D}"/>
+              </a:ext>
+            </a:extLst>
+          </p:cNvPr>
+          <p:cNvPicPr>
+            <a:picLocks noChangeAspect="1" noChangeArrowheads="1"/>
+          </p:cNvPicPr>
+          <p:nvPr/>
+        </p:nvPicPr>
+        <p:blipFill>
+          <a:blip r:embed="rId4">
+            <a:extLst>
+              <a:ext uri="{28A0092B-C50C-407E-A947-70E740481C1C}">
+                <a14:useLocalDpi xmlns:a14="http://schemas.microsoft.com/office/drawing/2010/main" val="0"/>
+              </a:ext>
+            </a:extLst>
+          </a:blip>
+          <a:srcRect/>
+          <a:stretch>
+            <a:fillRect/>
+          </a:stretch>
+        </p:blipFill>
+        <p:spPr bwMode="auto">
+          <a:xfrm>
+            <a:off x="7917873" y="5290705"/>
+            <a:ext cx="3505200" cy="1181100"/>
+          </a:xfrm>
+          <a:prstGeom prst="rect">
+            <a:avLst/>
+          </a:prstGeom>
+          <a:noFill/>
+          <a:extLst>
+            <a:ext uri="{909E8E84-426E-40DD-AFC4-6F175D3DCCD1}">
+              <a14:hiddenFill xmlns:a14="http://schemas.microsoft.com/office/drawing/2010/main">
+                <a:solidFill>
+                  <a:srgbClr val="FFFFFF"/>
+                </a:solidFill>
+              </a14:hiddenFill>
+            </a:ext>
+          </a:extLst>
+        </p:spPr>
+      </p:pic>
     </p:spTree>
     <p:extLst>
       <p:ext uri="{BB962C8B-B14F-4D97-AF65-F5344CB8AC3E}">

</xml_diff>